<commit_message>
Add module command for setting environment
</commit_message>
<xml_diff>
--- a/misc/FOCUS.pptx
+++ b/misc/FOCUS.pptx
@@ -304,7 +304,7 @@
           <a:p>
             <a:fld id="{66F2DB81-FDD4-6C4C-99FD-378D10BF8DE1}" type="datetimeFigureOut">
               <a:rPr kumimoji="1" lang="ja-JP" altLang="en-US" smtClean="0"/>
-              <a:t>16/01/05</a:t>
+              <a:t>16/01/07</a:t>
             </a:fld>
             <a:endParaRPr kumimoji="1" lang="ja-JP" altLang="en-US"/>
           </a:p>
@@ -501,7 +501,7 @@
           <a:p>
             <a:fld id="{66F2DB81-FDD4-6C4C-99FD-378D10BF8DE1}" type="datetimeFigureOut">
               <a:rPr kumimoji="1" lang="ja-JP" altLang="en-US" smtClean="0"/>
-              <a:t>16/01/05</a:t>
+              <a:t>16/01/07</a:t>
             </a:fld>
             <a:endParaRPr kumimoji="1" lang="ja-JP" altLang="en-US"/>
           </a:p>
@@ -708,7 +708,7 @@
           <a:p>
             <a:fld id="{66F2DB81-FDD4-6C4C-99FD-378D10BF8DE1}" type="datetimeFigureOut">
               <a:rPr kumimoji="1" lang="ja-JP" altLang="en-US" smtClean="0"/>
-              <a:t>16/01/05</a:t>
+              <a:t>16/01/07</a:t>
             </a:fld>
             <a:endParaRPr kumimoji="1" lang="ja-JP" altLang="en-US"/>
           </a:p>
@@ -905,7 +905,7 @@
           <a:p>
             <a:fld id="{66F2DB81-FDD4-6C4C-99FD-378D10BF8DE1}" type="datetimeFigureOut">
               <a:rPr kumimoji="1" lang="ja-JP" altLang="en-US" smtClean="0"/>
-              <a:t>16/01/05</a:t>
+              <a:t>16/01/07</a:t>
             </a:fld>
             <a:endParaRPr kumimoji="1" lang="ja-JP" altLang="en-US"/>
           </a:p>
@@ -1146,7 +1146,7 @@
           <a:p>
             <a:fld id="{66F2DB81-FDD4-6C4C-99FD-378D10BF8DE1}" type="datetimeFigureOut">
               <a:rPr kumimoji="1" lang="ja-JP" altLang="en-US" smtClean="0"/>
-              <a:t>16/01/05</a:t>
+              <a:t>16/01/07</a:t>
             </a:fld>
             <a:endParaRPr kumimoji="1" lang="ja-JP" altLang="en-US"/>
           </a:p>
@@ -1493,7 +1493,7 @@
           <a:p>
             <a:fld id="{66F2DB81-FDD4-6C4C-99FD-378D10BF8DE1}" type="datetimeFigureOut">
               <a:rPr kumimoji="1" lang="ja-JP" altLang="en-US" smtClean="0"/>
-              <a:t>16/01/05</a:t>
+              <a:t>16/01/07</a:t>
             </a:fld>
             <a:endParaRPr kumimoji="1" lang="ja-JP" altLang="en-US"/>
           </a:p>
@@ -1986,7 +1986,7 @@
           <a:p>
             <a:fld id="{66F2DB81-FDD4-6C4C-99FD-378D10BF8DE1}" type="datetimeFigureOut">
               <a:rPr kumimoji="1" lang="ja-JP" altLang="en-US" smtClean="0"/>
-              <a:t>16/01/05</a:t>
+              <a:t>16/01/07</a:t>
             </a:fld>
             <a:endParaRPr kumimoji="1" lang="ja-JP" altLang="en-US"/>
           </a:p>
@@ -2099,7 +2099,7 @@
           <a:p>
             <a:fld id="{66F2DB81-FDD4-6C4C-99FD-378D10BF8DE1}" type="datetimeFigureOut">
               <a:rPr kumimoji="1" lang="ja-JP" altLang="en-US" smtClean="0"/>
-              <a:t>16/01/05</a:t>
+              <a:t>16/01/07</a:t>
             </a:fld>
             <a:endParaRPr kumimoji="1" lang="ja-JP" altLang="en-US"/>
           </a:p>
@@ -2189,7 +2189,7 @@
           <a:p>
             <a:fld id="{66F2DB81-FDD4-6C4C-99FD-378D10BF8DE1}" type="datetimeFigureOut">
               <a:rPr kumimoji="1" lang="ja-JP" altLang="en-US" smtClean="0"/>
-              <a:t>16/01/05</a:t>
+              <a:t>16/01/07</a:t>
             </a:fld>
             <a:endParaRPr kumimoji="1" lang="ja-JP" altLang="en-US"/>
           </a:p>
@@ -2378,7 +2378,7 @@
           <a:p>
             <a:fld id="{66F2DB81-FDD4-6C4C-99FD-378D10BF8DE1}" type="datetimeFigureOut">
               <a:rPr kumimoji="1" lang="ja-JP" altLang="en-US" smtClean="0"/>
-              <a:t>16/01/05</a:t>
+              <a:t>16/01/07</a:t>
             </a:fld>
             <a:endParaRPr kumimoji="1" lang="ja-JP" altLang="en-US"/>
           </a:p>
@@ -2728,7 +2728,7 @@
           <a:p>
             <a:fld id="{66F2DB81-FDD4-6C4C-99FD-378D10BF8DE1}" type="datetimeFigureOut">
               <a:rPr kumimoji="1" lang="ja-JP" altLang="en-US" smtClean="0"/>
-              <a:t>16/01/05</a:t>
+              <a:t>16/01/07</a:t>
             </a:fld>
             <a:endParaRPr kumimoji="1" lang="ja-JP" altLang="en-US"/>
           </a:p>
@@ -3139,7 +3139,7 @@
           <a:p>
             <a:fld id="{66F2DB81-FDD4-6C4C-99FD-378D10BF8DE1}" type="datetimeFigureOut">
               <a:rPr kumimoji="1" lang="ja-JP" altLang="en-US" smtClean="0"/>
-              <a:t>16/01/05</a:t>
+              <a:t>16/01/07</a:t>
             </a:fld>
             <a:endParaRPr kumimoji="1" lang="ja-JP" altLang="en-US"/>
           </a:p>
@@ -3638,11 +3638,7 @@
             </a:r>
             <a:r>
               <a:rPr lang="ja-JP" altLang="en-US" sz="2400" dirty="0" smtClean="0"/>
-              <a:t>から</a:t>
-            </a:r>
-            <a:r>
-              <a:rPr lang="ja-JP" altLang="en-US" sz="2400" dirty="0" smtClean="0"/>
-              <a:t>入手</a:t>
+              <a:t>から入手</a:t>
             </a:r>
             <a:endParaRPr lang="en-US" altLang="ja-JP" sz="2400" dirty="0"/>
           </a:p>
@@ -3825,52 +3821,72 @@
             <a:pPr lvl="1"/>
             <a:r>
               <a:rPr lang="ja-JP" altLang="en-US" sz="2400" dirty="0" smtClean="0"/>
-              <a:t>下記のコマンドにより、</a:t>
-            </a:r>
-            <a:r>
-              <a:rPr lang="en-US" altLang="ja-JP" sz="2400" dirty="0" smtClean="0"/>
-              <a:t>XMP</a:t>
+              <a:t>下記のコマンドにより</a:t>
             </a:r>
             <a:r>
               <a:rPr lang="ja-JP" altLang="en-US" sz="2400" dirty="0" smtClean="0"/>
-              <a:t>への</a:t>
-            </a:r>
-            <a:r>
-              <a:rPr lang="en-US" altLang="ja-JP" sz="2400" dirty="0" smtClean="0"/>
+              <a:t>、</a:t>
+            </a:r>
+            <a:r>
+              <a:rPr lang="ja-JP" altLang="en-US" sz="2400" dirty="0" smtClean="0"/>
+              <a:t>環境</a:t>
+            </a:r>
+            <a:r>
+              <a:rPr lang="ja-JP" altLang="en-US" sz="2400" dirty="0" smtClean="0"/>
+              <a:t>設定を行う</a:t>
+            </a:r>
+            <a:endParaRPr lang="en-US" altLang="ja-JP" sz="2400" dirty="0" smtClean="0"/>
+          </a:p>
+          <a:p>
+            <a:pPr lvl="2"/>
+            <a:r>
+              <a:rPr lang="en-US" altLang="ja-JP" sz="2200" dirty="0"/>
+              <a:t>$ export PATH=/home1/</a:t>
+            </a:r>
+            <a:r>
+              <a:rPr lang="en-US" altLang="ja-JP" sz="2200" dirty="0" err="1"/>
+              <a:t>gleo</a:t>
+            </a:r>
+            <a:r>
+              <a:rPr lang="en-US" altLang="ja-JP" sz="2200" dirty="0"/>
+              <a:t>/</a:t>
+            </a:r>
+            <a:r>
+              <a:rPr lang="en-US" altLang="ja-JP" sz="2200" dirty="0" smtClean="0"/>
+              <a:t>share</a:t>
+            </a:r>
+            <a:r>
+              <a:rPr lang="en-US" altLang="ja-JP" sz="2200" dirty="0"/>
+              <a:t>/</a:t>
+            </a:r>
+            <a:r>
+              <a:rPr lang="en-US" altLang="ja-JP" sz="2200" dirty="0" err="1"/>
+              <a:t>xmp</a:t>
+            </a:r>
+            <a:r>
+              <a:rPr lang="en-US" altLang="ja-JP" sz="2200" dirty="0"/>
+              <a:t>/bin:$</a:t>
+            </a:r>
+            <a:r>
+              <a:rPr lang="en-US" altLang="ja-JP" sz="2200" dirty="0" smtClean="0"/>
               <a:t>PATH</a:t>
             </a:r>
-            <a:r>
-              <a:rPr lang="ja-JP" altLang="en-US" sz="2400" dirty="0" smtClean="0"/>
-              <a:t>を設定する</a:t>
-            </a:r>
-            <a:endParaRPr lang="en-US" altLang="ja-JP" sz="2400" dirty="0" smtClean="0"/>
-          </a:p>
-          <a:p>
-            <a:pPr lvl="1"/>
-            <a:r>
-              <a:rPr lang="en-US" altLang="ja-JP" sz="2400" dirty="0"/>
-              <a:t>$ export PATH=/home1/</a:t>
-            </a:r>
-            <a:r>
-              <a:rPr lang="en-US" altLang="ja-JP" sz="2400" dirty="0" err="1"/>
-              <a:t>gleo</a:t>
-            </a:r>
-            <a:r>
-              <a:rPr lang="en-US" altLang="ja-JP" sz="2400" dirty="0"/>
-              <a:t>/share/</a:t>
-            </a:r>
-            <a:r>
-              <a:rPr lang="en-US" altLang="ja-JP" sz="2400" dirty="0" err="1"/>
-              <a:t>xmp</a:t>
-            </a:r>
-            <a:r>
-              <a:rPr lang="en-US" altLang="ja-JP" sz="2400" dirty="0"/>
-              <a:t>/bin:$</a:t>
-            </a:r>
-            <a:r>
-              <a:rPr lang="en-US" altLang="ja-JP" sz="2400" dirty="0" smtClean="0"/>
-              <a:t>PATH</a:t>
-            </a:r>
+          </a:p>
+          <a:p>
+            <a:pPr lvl="2"/>
+            <a:r>
+              <a:rPr lang="en-US" altLang="ja-JP" sz="2200" dirty="0"/>
+              <a:t>$ module load PrgEnv-</a:t>
+            </a:r>
+            <a:r>
+              <a:rPr lang="en-US" altLang="ja-JP" sz="2200" dirty="0" smtClean="0"/>
+              <a:t>gnu482 gnu</a:t>
+            </a:r>
+            <a:r>
+              <a:rPr lang="en-US" altLang="ja-JP" sz="2200" dirty="0"/>
+              <a:t>/openmpi165</a:t>
+            </a:r>
+            <a:endParaRPr lang="en-US" altLang="ja-JP" sz="2200" dirty="0" smtClean="0"/>
           </a:p>
           <a:p>
             <a:pPr lvl="1"/>

</xml_diff>